<commit_message>
Secure the dynamic re-dimensionning of the overall GUI
</commit_message>
<xml_diff>
--- a/client/images/Python - Set - Maquette et icones.pptx
+++ b/client/images/Python - Set - Maquette et icones.pptx
@@ -4203,8 +4203,8 @@
         </p:nvSpPr>
         <p:spPr>
           <a:xfrm>
-            <a:off x="2847960" y="2582640"/>
-            <a:ext cx="4810680" cy="4091760"/>
+            <a:off x="2847960" y="1988840"/>
+            <a:ext cx="4810680" cy="4685560"/>
           </a:xfrm>
           <a:prstGeom prst="rect">
             <a:avLst/>
@@ -4240,8 +4240,119 @@
         </p:nvSpPr>
         <p:spPr>
           <a:xfrm>
-            <a:off x="2830680" y="539640"/>
-            <a:ext cx="4810680" cy="502200"/>
+            <a:off x="2806380" y="37440"/>
+            <a:ext cx="4225724" cy="502200"/>
+          </a:xfrm>
+          <a:prstGeom prst="rect">
+            <a:avLst/>
+          </a:prstGeom>
+          <a:noFill/>
+          <a:ln w="38160">
+            <a:solidFill>
+              <a:schemeClr val="tx1"/>
+            </a:solidFill>
+            <a:round/>
+          </a:ln>
+        </p:spPr>
+        <p:style>
+          <a:lnRef idx="2">
+            <a:schemeClr val="accent1">
+              <a:shade val="50000"/>
+            </a:schemeClr>
+          </a:lnRef>
+          <a:fillRef idx="1">
+            <a:schemeClr val="accent1"/>
+          </a:fillRef>
+          <a:effectRef idx="0">
+            <a:schemeClr val="accent1"/>
+          </a:effectRef>
+          <a:fontRef idx="minor"/>
+        </p:style>
+        <p:txBody>
+          <a:bodyPr lIns="90000" tIns="45000" rIns="90000" bIns="45000" anchor="ctr"/>
+          <a:lstStyle/>
+          <a:p>
+            <a:pPr algn="ctr">
+              <a:lnSpc>
+                <a:spcPct val="100000"/>
+              </a:lnSpc>
+            </a:pPr>
+            <a:r>
+              <a:rPr lang="en-US" sz="1600" b="0" strike="noStrike" spc="-1">
+                <a:solidFill>
+                  <a:srgbClr val="FF0000"/>
+                </a:solidFill>
+                <a:uFill>
+                  <a:solidFill>
+                    <a:srgbClr val="FFFFFF"/>
+                  </a:solidFill>
+                </a:uFill>
+                <a:latin typeface="Calibri"/>
+                <a:ea typeface="DejaVu Sans"/>
+              </a:rPr>
+              <a:t>Commands: new game, stop, connect to server…</a:t>
+            </a:r>
+            <a:endParaRPr lang="en-US" sz="1600" b="0" strike="noStrike" spc="-1">
+              <a:solidFill>
+                <a:srgbClr val="000000"/>
+              </a:solidFill>
+              <a:uFill>
+                <a:solidFill>
+                  <a:srgbClr val="FFFFFF"/>
+                </a:solidFill>
+              </a:uFill>
+              <a:latin typeface="Arial"/>
+            </a:endParaRPr>
+          </a:p>
+        </p:txBody>
+      </p:sp>
+      <p:sp>
+        <p:nvSpPr>
+          <p:cNvPr id="81" name="CustomShape 7"/>
+          <p:cNvSpPr/>
+          <p:nvPr/>
+        </p:nvSpPr>
+        <p:spPr>
+          <a:xfrm>
+            <a:off x="2847960" y="692696"/>
+            <a:ext cx="4793400" cy="1200960"/>
+          </a:xfrm>
+          <a:prstGeom prst="rect">
+            <a:avLst/>
+          </a:prstGeom>
+          <a:noFill/>
+          <a:ln w="38160">
+            <a:solidFill>
+              <a:schemeClr val="tx1"/>
+            </a:solidFill>
+            <a:round/>
+          </a:ln>
+        </p:spPr>
+        <p:style>
+          <a:lnRef idx="2">
+            <a:schemeClr val="accent1">
+              <a:shade val="50000"/>
+            </a:schemeClr>
+          </a:lnRef>
+          <a:fillRef idx="1">
+            <a:schemeClr val="accent1"/>
+          </a:fillRef>
+          <a:effectRef idx="0">
+            <a:schemeClr val="accent1"/>
+          </a:effectRef>
+          <a:fontRef idx="minor"/>
+        </p:style>
+      </p:sp>
+      <p:sp>
+        <p:nvSpPr>
+          <p:cNvPr id="82" name="CustomShape 8"/>
+          <p:cNvSpPr/>
+          <p:nvPr/>
+        </p:nvSpPr>
+        <p:spPr>
+          <a:xfrm>
+            <a:off x="5295960" y="762176"/>
+            <a:ext cx="2223000" cy="1017720"/>
           </a:xfrm>
           <a:prstGeom prst="rect">
             <a:avLst/>
@@ -4290,7 +4401,7 @@
                 <a:latin typeface="Calibri"/>
                 <a:ea typeface="DejaVu Sans"/>
               </a:rPr>
-              <a:t>Commands: new game, stop, connect to server…</a:t>
+              <a:t>other players</a:t>
             </a:r>
             <a:endParaRPr lang="en-US" sz="1800" b="0" strike="noStrike" spc="-1">
               <a:solidFill>
@@ -4308,124 +4419,13 @@
       </p:sp>
       <p:sp>
         <p:nvSpPr>
-          <p:cNvPr id="81" name="CustomShape 7"/>
-          <p:cNvSpPr/>
-          <p:nvPr/>
-        </p:nvSpPr>
-        <p:spPr>
-          <a:xfrm>
-            <a:off x="2847960" y="1200240"/>
-            <a:ext cx="4793400" cy="1200960"/>
-          </a:xfrm>
-          <a:prstGeom prst="rect">
-            <a:avLst/>
-          </a:prstGeom>
-          <a:noFill/>
-          <a:ln w="38160">
-            <a:solidFill>
-              <a:schemeClr val="tx1"/>
-            </a:solidFill>
-            <a:round/>
-          </a:ln>
-        </p:spPr>
-        <p:style>
-          <a:lnRef idx="2">
-            <a:schemeClr val="accent1">
-              <a:shade val="50000"/>
-            </a:schemeClr>
-          </a:lnRef>
-          <a:fillRef idx="1">
-            <a:schemeClr val="accent1"/>
-          </a:fillRef>
-          <a:effectRef idx="0">
-            <a:schemeClr val="accent1"/>
-          </a:effectRef>
-          <a:fontRef idx="minor"/>
-        </p:style>
-      </p:sp>
-      <p:sp>
-        <p:nvSpPr>
-          <p:cNvPr id="82" name="CustomShape 8"/>
-          <p:cNvSpPr/>
-          <p:nvPr/>
-        </p:nvSpPr>
-        <p:spPr>
-          <a:xfrm>
-            <a:off x="5295960" y="1269720"/>
-            <a:ext cx="2223000" cy="1017720"/>
-          </a:xfrm>
-          <a:prstGeom prst="rect">
-            <a:avLst/>
-          </a:prstGeom>
-          <a:noFill/>
-          <a:ln w="38160">
-            <a:solidFill>
-              <a:schemeClr val="tx1"/>
-            </a:solidFill>
-            <a:round/>
-          </a:ln>
-        </p:spPr>
-        <p:style>
-          <a:lnRef idx="2">
-            <a:schemeClr val="accent1">
-              <a:shade val="50000"/>
-            </a:schemeClr>
-          </a:lnRef>
-          <a:fillRef idx="1">
-            <a:schemeClr val="accent1"/>
-          </a:fillRef>
-          <a:effectRef idx="0">
-            <a:schemeClr val="accent1"/>
-          </a:effectRef>
-          <a:fontRef idx="minor"/>
-        </p:style>
-        <p:txBody>
-          <a:bodyPr lIns="90000" tIns="45000" rIns="90000" bIns="45000" anchor="ctr"/>
-          <a:lstStyle/>
-          <a:p>
-            <a:pPr algn="ctr">
-              <a:lnSpc>
-                <a:spcPct val="100000"/>
-              </a:lnSpc>
-            </a:pPr>
-            <a:r>
-              <a:rPr lang="en-US" sz="1800" b="0" strike="noStrike" spc="-1">
-                <a:solidFill>
-                  <a:srgbClr val="FF0000"/>
-                </a:solidFill>
-                <a:uFill>
-                  <a:solidFill>
-                    <a:srgbClr val="FFFFFF"/>
-                  </a:solidFill>
-                </a:uFill>
-                <a:latin typeface="Calibri"/>
-                <a:ea typeface="DejaVu Sans"/>
-              </a:rPr>
-              <a:t>other players</a:t>
-            </a:r>
-            <a:endParaRPr lang="en-US" sz="1800" b="0" strike="noStrike" spc="-1">
-              <a:solidFill>
-                <a:srgbClr val="000000"/>
-              </a:solidFill>
-              <a:uFill>
-                <a:solidFill>
-                  <a:srgbClr val="FFFFFF"/>
-                </a:solidFill>
-              </a:uFill>
-              <a:latin typeface="Arial"/>
-            </a:endParaRPr>
-          </a:p>
-        </p:txBody>
-      </p:sp>
-      <p:sp>
-        <p:nvSpPr>
           <p:cNvPr id="83" name="CustomShape 9"/>
           <p:cNvSpPr/>
           <p:nvPr/>
         </p:nvSpPr>
         <p:spPr>
           <a:xfrm>
-            <a:off x="2948040" y="1275120"/>
+            <a:off x="2948040" y="767576"/>
             <a:ext cx="1989720" cy="1012320"/>
           </a:xfrm>
           <a:prstGeom prst="rect">
@@ -4600,9 +4600,9 @@
           <p:nvPr/>
         </p:nvSpPr>
         <p:spPr>
-          <a:xfrm flipH="1">
-            <a:off x="7918560" y="757080"/>
-            <a:ext cx="1049040" cy="360"/>
+          <a:xfrm flipH="1" flipV="1">
+            <a:off x="7032104" y="447480"/>
+            <a:ext cx="1935496" cy="309600"/>
           </a:xfrm>
           <a:custGeom>
             <a:avLst/>
@@ -4651,7 +4651,7 @@
         </p:nvSpPr>
         <p:spPr>
           <a:xfrm>
-            <a:off x="8920080" y="1379520"/>
+            <a:off x="8920080" y="1124744"/>
             <a:ext cx="1064520" cy="363960"/>
           </a:xfrm>
           <a:prstGeom prst="rect">
@@ -4720,7 +4720,7 @@
         </p:nvSpPr>
         <p:spPr>
           <a:xfrm flipH="1">
-            <a:off x="7946640" y="1564200"/>
+            <a:off x="7946640" y="1309424"/>
             <a:ext cx="1049040" cy="360"/>
           </a:xfrm>
           <a:custGeom>
@@ -5410,8 +5410,8 @@
         </p:nvSpPr>
         <p:spPr>
           <a:xfrm>
-            <a:off x="3017520" y="2708280"/>
-            <a:ext cx="4388400" cy="2868840"/>
+            <a:off x="3017520" y="2060848"/>
+            <a:ext cx="4388400" cy="3516272"/>
           </a:xfrm>
           <a:prstGeom prst="rect">
             <a:avLst/>
@@ -9830,7 +9830,7 @@
         </p:nvGrpSpPr>
         <p:grpSpPr>
           <a:xfrm>
-            <a:off x="7248128" y="1196752"/>
+            <a:off x="6240016" y="1196752"/>
             <a:ext cx="3672408" cy="3601855"/>
             <a:chOff x="5951984" y="2204864"/>
             <a:chExt cx="4805742" cy="3601855"/>
@@ -9980,8 +9980,8 @@
         </p:nvSpPr>
         <p:spPr>
           <a:xfrm>
-            <a:off x="8328248" y="5517232"/>
-            <a:ext cx="1762021" cy="369332"/>
+            <a:off x="7392144" y="5340562"/>
+            <a:ext cx="1762021" cy="646331"/>
           </a:xfrm>
           <a:prstGeom prst="rect">
             <a:avLst/>
@@ -9994,13 +9994,33 @@
           </a:bodyPr>
           <a:lstStyle/>
           <a:p>
+            <a:pPr algn="ctr"/>
             <a:r>
               <a:rPr lang="fr-FR" dirty="0" err="1" smtClean="0"/>
               <a:t>button</a:t>
             </a:r>
             <a:r>
               <a:rPr lang="fr-FR" dirty="0" smtClean="0"/>
-              <a:t>    ‘menu’</a:t>
+              <a:t>    ‘menu</a:t>
+            </a:r>
+            <a:r>
+              <a:rPr lang="fr-FR" dirty="0" smtClean="0"/>
+              <a:t>’</a:t>
+            </a:r>
+            <a:br>
+              <a:rPr lang="fr-FR" dirty="0" smtClean="0"/>
+            </a:br>
+            <a:r>
+              <a:rPr lang="fr-FR" dirty="0" smtClean="0"/>
+              <a:t>(</a:t>
+            </a:r>
+            <a:r>
+              <a:rPr lang="fr-FR" dirty="0" err="1" smtClean="0"/>
+              <a:t>wide</a:t>
+            </a:r>
+            <a:r>
+              <a:rPr lang="fr-FR" dirty="0" smtClean="0"/>
+              <a:t>)</a:t>
             </a:r>
             <a:endParaRPr lang="fr-FR" dirty="0"/>
           </a:p>
@@ -10215,6 +10235,210 @@
             <a:r>
               <a:rPr lang="fr-FR" dirty="0" smtClean="0"/>
               <a:t>    ‘config’</a:t>
+            </a:r>
+            <a:endParaRPr lang="fr-FR" dirty="0"/>
+          </a:p>
+        </p:txBody>
+      </p:sp>
+      <p:grpSp>
+        <p:nvGrpSpPr>
+          <p:cNvPr id="13" name="Groupe 12"/>
+          <p:cNvGrpSpPr/>
+          <p:nvPr/>
+        </p:nvGrpSpPr>
+        <p:grpSpPr>
+          <a:xfrm>
+            <a:off x="10286503" y="1196752"/>
+            <a:ext cx="1728192" cy="3601855"/>
+            <a:chOff x="5951984" y="2204864"/>
+            <a:chExt cx="4805742" cy="3601855"/>
+          </a:xfrm>
+        </p:grpSpPr>
+        <p:sp>
+          <p:nvSpPr>
+            <p:cNvPr id="16" name="CustomShape 5"/>
+            <p:cNvSpPr/>
+            <p:nvPr/>
+          </p:nvSpPr>
+          <p:spPr>
+            <a:xfrm rot="10800000">
+              <a:off x="5951984" y="4941168"/>
+              <a:ext cx="4805742" cy="865551"/>
+            </a:xfrm>
+            <a:prstGeom prst="roundRect">
+              <a:avLst>
+                <a:gd name="adj" fmla="val 50000"/>
+              </a:avLst>
+            </a:prstGeom>
+            <a:solidFill>
+              <a:schemeClr val="accent6">
+                <a:lumMod val="50000"/>
+              </a:schemeClr>
+            </a:solidFill>
+            <a:ln>
+              <a:solidFill>
+                <a:schemeClr val="accent6">
+                  <a:lumMod val="50000"/>
+                </a:schemeClr>
+              </a:solidFill>
+              <a:round/>
+            </a:ln>
+          </p:spPr>
+          <p:style>
+            <a:lnRef idx="2">
+              <a:schemeClr val="accent1">
+                <a:shade val="50000"/>
+              </a:schemeClr>
+            </a:lnRef>
+            <a:fillRef idx="1">
+              <a:schemeClr val="accent1"/>
+            </a:fillRef>
+            <a:effectRef idx="0">
+              <a:schemeClr val="accent1"/>
+            </a:effectRef>
+            <a:fontRef idx="minor"/>
+          </p:style>
+        </p:sp>
+        <p:sp>
+          <p:nvSpPr>
+            <p:cNvPr id="17" name="CustomShape 5"/>
+            <p:cNvSpPr/>
+            <p:nvPr/>
+          </p:nvSpPr>
+          <p:spPr>
+            <a:xfrm rot="10800000">
+              <a:off x="5951984" y="3571561"/>
+              <a:ext cx="4805742" cy="865551"/>
+            </a:xfrm>
+            <a:prstGeom prst="roundRect">
+              <a:avLst>
+                <a:gd name="adj" fmla="val 50000"/>
+              </a:avLst>
+            </a:prstGeom>
+            <a:solidFill>
+              <a:schemeClr val="accent6">
+                <a:lumMod val="50000"/>
+              </a:schemeClr>
+            </a:solidFill>
+            <a:ln>
+              <a:solidFill>
+                <a:schemeClr val="accent6">
+                  <a:lumMod val="50000"/>
+                </a:schemeClr>
+              </a:solidFill>
+              <a:round/>
+            </a:ln>
+          </p:spPr>
+          <p:style>
+            <a:lnRef idx="2">
+              <a:schemeClr val="accent1">
+                <a:shade val="50000"/>
+              </a:schemeClr>
+            </a:lnRef>
+            <a:fillRef idx="1">
+              <a:schemeClr val="accent1"/>
+            </a:fillRef>
+            <a:effectRef idx="0">
+              <a:schemeClr val="accent1"/>
+            </a:effectRef>
+            <a:fontRef idx="minor"/>
+          </p:style>
+        </p:sp>
+        <p:sp>
+          <p:nvSpPr>
+            <p:cNvPr id="21" name="CustomShape 5"/>
+            <p:cNvSpPr/>
+            <p:nvPr/>
+          </p:nvSpPr>
+          <p:spPr>
+            <a:xfrm rot="10800000">
+              <a:off x="5951984" y="2204864"/>
+              <a:ext cx="4805742" cy="865551"/>
+            </a:xfrm>
+            <a:prstGeom prst="roundRect">
+              <a:avLst>
+                <a:gd name="adj" fmla="val 50000"/>
+              </a:avLst>
+            </a:prstGeom>
+            <a:solidFill>
+              <a:schemeClr val="accent6">
+                <a:lumMod val="50000"/>
+              </a:schemeClr>
+            </a:solidFill>
+            <a:ln>
+              <a:solidFill>
+                <a:schemeClr val="accent6">
+                  <a:lumMod val="50000"/>
+                </a:schemeClr>
+              </a:solidFill>
+              <a:round/>
+            </a:ln>
+          </p:spPr>
+          <p:style>
+            <a:lnRef idx="2">
+              <a:schemeClr val="accent1">
+                <a:shade val="50000"/>
+              </a:schemeClr>
+            </a:lnRef>
+            <a:fillRef idx="1">
+              <a:schemeClr val="accent1"/>
+            </a:fillRef>
+            <a:effectRef idx="0">
+              <a:schemeClr val="accent1"/>
+            </a:effectRef>
+            <a:fontRef idx="minor"/>
+          </p:style>
+        </p:sp>
+      </p:grpSp>
+      <p:sp>
+        <p:nvSpPr>
+          <p:cNvPr id="22" name="ZoneTexte 21"/>
+          <p:cNvSpPr txBox="1"/>
+          <p:nvPr/>
+        </p:nvSpPr>
+        <p:spPr>
+          <a:xfrm>
+            <a:off x="10252227" y="5340562"/>
+            <a:ext cx="1762021" cy="646331"/>
+          </a:xfrm>
+          <a:prstGeom prst="rect">
+            <a:avLst/>
+          </a:prstGeom>
+          <a:noFill/>
+        </p:spPr>
+        <p:txBody>
+          <a:bodyPr wrap="none" rtlCol="0">
+            <a:spAutoFit/>
+          </a:bodyPr>
+          <a:lstStyle/>
+          <a:p>
+            <a:pPr algn="ctr"/>
+            <a:r>
+              <a:rPr lang="fr-FR" dirty="0" err="1" smtClean="0"/>
+              <a:t>button</a:t>
+            </a:r>
+            <a:r>
+              <a:rPr lang="fr-FR" dirty="0" smtClean="0"/>
+              <a:t>    ‘menu</a:t>
+            </a:r>
+            <a:r>
+              <a:rPr lang="fr-FR" dirty="0" smtClean="0"/>
+              <a:t>’</a:t>
+            </a:r>
+            <a:br>
+              <a:rPr lang="fr-FR" dirty="0" smtClean="0"/>
+            </a:br>
+            <a:r>
+              <a:rPr lang="fr-FR" dirty="0" smtClean="0"/>
+              <a:t>(</a:t>
+            </a:r>
+            <a:r>
+              <a:rPr lang="fr-FR" dirty="0" err="1" smtClean="0"/>
+              <a:t>narrow</a:t>
+            </a:r>
+            <a:r>
+              <a:rPr lang="fr-FR" dirty="0" smtClean="0"/>
+              <a:t>)</a:t>
             </a:r>
             <a:endParaRPr lang="fr-FR" dirty="0"/>
           </a:p>
@@ -26349,6 +26573,291 @@
             <a:r>
               <a:rPr lang="fr-FR" dirty="0" smtClean="0"/>
               <a:t>   ‘connect'</a:t>
+            </a:r>
+            <a:endParaRPr lang="fr-FR" dirty="0"/>
+          </a:p>
+        </p:txBody>
+      </p:sp>
+      <p:grpSp>
+        <p:nvGrpSpPr>
+          <p:cNvPr id="2" name="Groupe 1"/>
+          <p:cNvGrpSpPr/>
+          <p:nvPr/>
+        </p:nvGrpSpPr>
+        <p:grpSpPr>
+          <a:xfrm>
+            <a:off x="6316766" y="1567975"/>
+            <a:ext cx="4493424" cy="2403078"/>
+            <a:chOff x="6418802" y="2623505"/>
+            <a:chExt cx="4493424" cy="2403078"/>
+          </a:xfrm>
+        </p:grpSpPr>
+        <p:sp>
+          <p:nvSpPr>
+            <p:cNvPr id="16" name="Flèche droite 15"/>
+            <p:cNvSpPr/>
+            <p:nvPr/>
+          </p:nvSpPr>
+          <p:spPr>
+            <a:xfrm>
+              <a:off x="7536160" y="3501008"/>
+              <a:ext cx="866416" cy="648072"/>
+            </a:xfrm>
+            <a:prstGeom prst="rightArrow">
+              <a:avLst/>
+            </a:prstGeom>
+            <a:solidFill>
+              <a:srgbClr val="FF6600"/>
+            </a:solidFill>
+            <a:ln>
+              <a:solidFill>
+                <a:srgbClr val="FF6600"/>
+              </a:solidFill>
+            </a:ln>
+          </p:spPr>
+          <p:style>
+            <a:lnRef idx="2">
+              <a:schemeClr val="accent1">
+                <a:shade val="50000"/>
+              </a:schemeClr>
+            </a:lnRef>
+            <a:fillRef idx="1">
+              <a:schemeClr val="accent1"/>
+            </a:fillRef>
+            <a:effectRef idx="0">
+              <a:schemeClr val="accent1"/>
+            </a:effectRef>
+            <a:fontRef idx="minor">
+              <a:schemeClr val="lt1"/>
+            </a:fontRef>
+          </p:style>
+          <p:txBody>
+            <a:bodyPr rtlCol="0" anchor="ctr"/>
+            <a:lstStyle/>
+            <a:p>
+              <a:pPr algn="ctr"/>
+              <a:endParaRPr lang="fr-FR"/>
+            </a:p>
+          </p:txBody>
+        </p:sp>
+        <p:sp>
+          <p:nvSpPr>
+            <p:cNvPr id="18" name="Rectangle à coins arrondis 17"/>
+            <p:cNvSpPr/>
+            <p:nvPr/>
+          </p:nvSpPr>
+          <p:spPr>
+            <a:xfrm>
+              <a:off x="6418802" y="3140968"/>
+              <a:ext cx="873032" cy="1368152"/>
+            </a:xfrm>
+            <a:prstGeom prst="roundRect">
+              <a:avLst/>
+            </a:prstGeom>
+            <a:solidFill>
+              <a:schemeClr val="accent6">
+                <a:lumMod val="20000"/>
+                <a:lumOff val="80000"/>
+              </a:schemeClr>
+            </a:solidFill>
+            <a:ln w="76200">
+              <a:solidFill>
+                <a:srgbClr val="FF6600"/>
+              </a:solidFill>
+            </a:ln>
+          </p:spPr>
+          <p:style>
+            <a:lnRef idx="2">
+              <a:schemeClr val="accent1">
+                <a:shade val="50000"/>
+              </a:schemeClr>
+            </a:lnRef>
+            <a:fillRef idx="1">
+              <a:schemeClr val="accent1"/>
+            </a:fillRef>
+            <a:effectRef idx="0">
+              <a:schemeClr val="accent1"/>
+            </a:effectRef>
+            <a:fontRef idx="minor">
+              <a:schemeClr val="lt1"/>
+            </a:fontRef>
+          </p:style>
+          <p:txBody>
+            <a:bodyPr rtlCol="0" anchor="ctr"/>
+            <a:lstStyle/>
+            <a:p>
+              <a:pPr algn="ctr"/>
+              <a:endParaRPr lang="fr-FR"/>
+            </a:p>
+          </p:txBody>
+        </p:sp>
+        <p:grpSp>
+          <p:nvGrpSpPr>
+            <p:cNvPr id="23" name="Groupe 22"/>
+            <p:cNvGrpSpPr>
+              <a:grpSpLocks noChangeAspect="1"/>
+            </p:cNvGrpSpPr>
+            <p:nvPr/>
+          </p:nvGrpSpPr>
+          <p:grpSpPr>
+            <a:xfrm>
+              <a:off x="8937317" y="2623505"/>
+              <a:ext cx="1974909" cy="2403078"/>
+              <a:chOff x="1402920" y="989280"/>
+              <a:chExt cx="1949400" cy="2372040"/>
+            </a:xfrm>
+            <a:solidFill>
+              <a:srgbClr val="00B050"/>
+            </a:solidFill>
+          </p:grpSpPr>
+          <p:sp>
+            <p:nvSpPr>
+              <p:cNvPr id="24" name="CustomShape 1"/>
+              <p:cNvSpPr/>
+              <p:nvPr/>
+            </p:nvSpPr>
+            <p:spPr>
+              <a:xfrm rot="19967400">
+                <a:off x="1402920" y="989280"/>
+                <a:ext cx="1343520" cy="2067120"/>
+              </a:xfrm>
+              <a:prstGeom prst="roundRect">
+                <a:avLst>
+                  <a:gd name="adj" fmla="val 16667"/>
+                </a:avLst>
+              </a:prstGeom>
+              <a:grpFill/>
+              <a:ln w="63360">
+                <a:solidFill>
+                  <a:schemeClr val="bg1"/>
+                </a:solidFill>
+                <a:round/>
+              </a:ln>
+            </p:spPr>
+            <p:style>
+              <a:lnRef idx="2">
+                <a:schemeClr val="accent1">
+                  <a:shade val="50000"/>
+                </a:schemeClr>
+              </a:lnRef>
+              <a:fillRef idx="1">
+                <a:schemeClr val="accent1"/>
+              </a:fillRef>
+              <a:effectRef idx="0">
+                <a:schemeClr val="accent1"/>
+              </a:effectRef>
+              <a:fontRef idx="minor"/>
+            </p:style>
+          </p:sp>
+          <p:sp>
+            <p:nvSpPr>
+              <p:cNvPr id="25" name="CustomShape 2"/>
+              <p:cNvSpPr/>
+              <p:nvPr/>
+            </p:nvSpPr>
+            <p:spPr>
+              <a:xfrm rot="78600">
+                <a:off x="1738440" y="1062720"/>
+                <a:ext cx="1343520" cy="2067120"/>
+              </a:xfrm>
+              <a:prstGeom prst="roundRect">
+                <a:avLst>
+                  <a:gd name="adj" fmla="val 16667"/>
+                </a:avLst>
+              </a:prstGeom>
+              <a:grpFill/>
+              <a:ln w="63360">
+                <a:solidFill>
+                  <a:schemeClr val="bg1"/>
+                </a:solidFill>
+                <a:round/>
+              </a:ln>
+            </p:spPr>
+            <p:style>
+              <a:lnRef idx="2">
+                <a:schemeClr val="accent1">
+                  <a:shade val="50000"/>
+                </a:schemeClr>
+              </a:lnRef>
+              <a:fillRef idx="1">
+                <a:schemeClr val="accent1"/>
+              </a:fillRef>
+              <a:effectRef idx="0">
+                <a:schemeClr val="accent1"/>
+              </a:effectRef>
+              <a:fontRef idx="minor"/>
+            </p:style>
+          </p:sp>
+          <p:sp>
+            <p:nvSpPr>
+              <p:cNvPr id="26" name="CustomShape 3"/>
+              <p:cNvSpPr/>
+              <p:nvPr/>
+            </p:nvSpPr>
+            <p:spPr>
+              <a:xfrm rot="1252200">
+                <a:off x="2008800" y="1294200"/>
+                <a:ext cx="1343520" cy="2067120"/>
+              </a:xfrm>
+              <a:prstGeom prst="roundRect">
+                <a:avLst>
+                  <a:gd name="adj" fmla="val 16667"/>
+                </a:avLst>
+              </a:prstGeom>
+              <a:grpFill/>
+              <a:ln w="63360">
+                <a:solidFill>
+                  <a:schemeClr val="bg1"/>
+                </a:solidFill>
+                <a:round/>
+              </a:ln>
+            </p:spPr>
+            <p:style>
+              <a:lnRef idx="2">
+                <a:schemeClr val="accent1">
+                  <a:shade val="50000"/>
+                </a:schemeClr>
+              </a:lnRef>
+              <a:fillRef idx="1">
+                <a:schemeClr val="accent1"/>
+              </a:fillRef>
+              <a:effectRef idx="0">
+                <a:schemeClr val="accent1"/>
+              </a:effectRef>
+              <a:fontRef idx="minor"/>
+            </p:style>
+          </p:sp>
+        </p:grpSp>
+      </p:grpSp>
+      <p:sp>
+        <p:nvSpPr>
+          <p:cNvPr id="28" name="ZoneTexte 27"/>
+          <p:cNvSpPr txBox="1"/>
+          <p:nvPr/>
+        </p:nvSpPr>
+        <p:spPr>
+          <a:xfrm>
+            <a:off x="6855318" y="4941168"/>
+            <a:ext cx="3416320" cy="369332"/>
+          </a:xfrm>
+          <a:prstGeom prst="rect">
+            <a:avLst/>
+          </a:prstGeom>
+          <a:noFill/>
+        </p:spPr>
+        <p:txBody>
+          <a:bodyPr wrap="none" rtlCol="0">
+            <a:spAutoFit/>
+          </a:bodyPr>
+          <a:lstStyle/>
+          <a:p>
+            <a:r>
+              <a:rPr lang="fr-FR" dirty="0" err="1" smtClean="0"/>
+              <a:t>button</a:t>
+            </a:r>
+            <a:r>
+              <a:rPr lang="fr-FR" dirty="0" smtClean="0"/>
+              <a:t>   ‘connect‘ – new version</a:t>
             </a:r>
             <a:endParaRPr lang="fr-FR" dirty="0"/>
           </a:p>

</xml_diff>